<commit_message>
Jan 19 update of Github
Updates that fix Test I/O and add functionality to receive EyeLink data over ethernet
</commit_message>
<xml_diff>
--- a/doc/Adapter Hierarchy.pptx
+++ b/doc/Adapter Hierarchy.pptx
@@ -106,7 +106,7 @@
   </p:defaultTextStyle>
   <p:extLst>
     <p:ext uri="{EFAFB233-063F-42B5-8137-9DF3F51BA10A}">
-      <p15:sldGuideLst xmlns:p15="http://schemas.microsoft.com/office/powerpoint/2012/main" xmlns="">
+      <p15:sldGuideLst xmlns:p15="http://schemas.microsoft.com/office/powerpoint/2012/main">
         <p15:guide id="1" orient="horz" pos="2160">
           <p15:clr>
             <a:srgbClr val="A4A3A4"/>
@@ -306,7 +306,7 @@
           <a:p>
             <a:fld id="{CBC1FBFD-2364-4323-8B98-4D17E99ACD86}" type="datetimeFigureOut">
               <a:rPr lang="en-US" smtClean="0"/>
-              <a:t>10/30/2017</a:t>
+              <a:t>1/17/2018</a:t>
             </a:fld>
             <a:endParaRPr lang="en-US"/>
           </a:p>
@@ -474,7 +474,7 @@
           <a:p>
             <a:fld id="{CBC1FBFD-2364-4323-8B98-4D17E99ACD86}" type="datetimeFigureOut">
               <a:rPr lang="en-US" smtClean="0"/>
-              <a:t>10/30/2017</a:t>
+              <a:t>1/17/2018</a:t>
             </a:fld>
             <a:endParaRPr lang="en-US"/>
           </a:p>
@@ -652,7 +652,7 @@
           <a:p>
             <a:fld id="{CBC1FBFD-2364-4323-8B98-4D17E99ACD86}" type="datetimeFigureOut">
               <a:rPr lang="en-US" smtClean="0"/>
-              <a:t>10/30/2017</a:t>
+              <a:t>1/17/2018</a:t>
             </a:fld>
             <a:endParaRPr lang="en-US"/>
           </a:p>
@@ -820,7 +820,7 @@
           <a:p>
             <a:fld id="{CBC1FBFD-2364-4323-8B98-4D17E99ACD86}" type="datetimeFigureOut">
               <a:rPr lang="en-US" smtClean="0"/>
-              <a:t>10/30/2017</a:t>
+              <a:t>1/17/2018</a:t>
             </a:fld>
             <a:endParaRPr lang="en-US"/>
           </a:p>
@@ -1065,7 +1065,7 @@
           <a:p>
             <a:fld id="{CBC1FBFD-2364-4323-8B98-4D17E99ACD86}" type="datetimeFigureOut">
               <a:rPr lang="en-US" smtClean="0"/>
-              <a:t>10/30/2017</a:t>
+              <a:t>1/17/2018</a:t>
             </a:fld>
             <a:endParaRPr lang="en-US"/>
           </a:p>
@@ -1350,7 +1350,7 @@
           <a:p>
             <a:fld id="{CBC1FBFD-2364-4323-8B98-4D17E99ACD86}" type="datetimeFigureOut">
               <a:rPr lang="en-US" smtClean="0"/>
-              <a:t>10/30/2017</a:t>
+              <a:t>1/17/2018</a:t>
             </a:fld>
             <a:endParaRPr lang="en-US"/>
           </a:p>
@@ -1769,7 +1769,7 @@
           <a:p>
             <a:fld id="{CBC1FBFD-2364-4323-8B98-4D17E99ACD86}" type="datetimeFigureOut">
               <a:rPr lang="en-US" smtClean="0"/>
-              <a:t>10/30/2017</a:t>
+              <a:t>1/17/2018</a:t>
             </a:fld>
             <a:endParaRPr lang="en-US"/>
           </a:p>
@@ -1886,7 +1886,7 @@
           <a:p>
             <a:fld id="{CBC1FBFD-2364-4323-8B98-4D17E99ACD86}" type="datetimeFigureOut">
               <a:rPr lang="en-US" smtClean="0"/>
-              <a:t>10/30/2017</a:t>
+              <a:t>1/17/2018</a:t>
             </a:fld>
             <a:endParaRPr lang="en-US"/>
           </a:p>
@@ -1981,7 +1981,7 @@
           <a:p>
             <a:fld id="{CBC1FBFD-2364-4323-8B98-4D17E99ACD86}" type="datetimeFigureOut">
               <a:rPr lang="en-US" smtClean="0"/>
-              <a:t>10/30/2017</a:t>
+              <a:t>1/17/2018</a:t>
             </a:fld>
             <a:endParaRPr lang="en-US"/>
           </a:p>
@@ -2256,7 +2256,7 @@
           <a:p>
             <a:fld id="{CBC1FBFD-2364-4323-8B98-4D17E99ACD86}" type="datetimeFigureOut">
               <a:rPr lang="en-US" smtClean="0"/>
-              <a:t>10/30/2017</a:t>
+              <a:t>1/17/2018</a:t>
             </a:fld>
             <a:endParaRPr lang="en-US"/>
           </a:p>
@@ -2508,7 +2508,7 @@
           <a:p>
             <a:fld id="{CBC1FBFD-2364-4323-8B98-4D17E99ACD86}" type="datetimeFigureOut">
               <a:rPr lang="en-US" smtClean="0"/>
-              <a:t>10/30/2017</a:t>
+              <a:t>1/17/2018</a:t>
             </a:fld>
             <a:endParaRPr lang="en-US"/>
           </a:p>
@@ -2719,7 +2719,7 @@
           <a:p>
             <a:fld id="{CBC1FBFD-2364-4323-8B98-4D17E99ACD86}" type="datetimeFigureOut">
               <a:rPr lang="en-US" smtClean="0"/>
-              <a:t>10/30/2017</a:t>
+              <a:t>1/17/2018</a:t>
             </a:fld>
             <a:endParaRPr lang="en-US"/>
           </a:p>
@@ -3596,7 +3596,7 @@
         </p:nvSpPr>
         <p:spPr>
           <a:xfrm>
-            <a:off x="5029200" y="3609703"/>
+            <a:off x="6986307" y="3609431"/>
             <a:ext cx="1676400" cy="381000"/>
           </a:xfrm>
           <a:prstGeom prst="rect">
@@ -4190,7 +4190,7 @@
         <p:spPr>
           <a:xfrm>
             <a:off x="4876800" y="3217817"/>
-            <a:ext cx="990600" cy="391886"/>
+            <a:ext cx="2947707" cy="391614"/>
           </a:xfrm>
           <a:prstGeom prst="straightConnector1">
             <a:avLst/>
@@ -4581,6 +4581,108 @@
           <a:xfrm>
             <a:off x="5867400" y="2430780"/>
             <a:ext cx="960120" cy="406037"/>
+          </a:xfrm>
+          <a:prstGeom prst="straightConnector1">
+            <a:avLst/>
+          </a:prstGeom>
+          <a:ln>
+            <a:solidFill>
+              <a:schemeClr val="tx1"/>
+            </a:solidFill>
+            <a:tailEnd type="triangle"/>
+          </a:ln>
+        </p:spPr>
+        <p:style>
+          <a:lnRef idx="1">
+            <a:schemeClr val="accent1"/>
+          </a:lnRef>
+          <a:fillRef idx="0">
+            <a:schemeClr val="accent1"/>
+          </a:fillRef>
+          <a:effectRef idx="0">
+            <a:schemeClr val="accent1"/>
+          </a:effectRef>
+          <a:fontRef idx="minor">
+            <a:schemeClr val="tx1"/>
+          </a:fontRef>
+        </p:style>
+      </p:cxnSp>
+      <p:sp>
+        <p:nvSpPr>
+          <p:cNvPr id="37" name="Rectangle 36">
+            <a:extLst>
+              <a:ext uri="{FF2B5EF4-FFF2-40B4-BE49-F238E27FC236}">
+                <a16:creationId xmlns:a16="http://schemas.microsoft.com/office/drawing/2014/main" id="{EEBAA1B1-595C-4D59-91B2-B737256B2A1C}"/>
+              </a:ext>
+            </a:extLst>
+          </p:cNvPr>
+          <p:cNvSpPr/>
+          <p:nvPr/>
+        </p:nvSpPr>
+        <p:spPr>
+          <a:xfrm>
+            <a:off x="5029200" y="3609431"/>
+            <a:ext cx="1676400" cy="381000"/>
+          </a:xfrm>
+          <a:prstGeom prst="rect">
+            <a:avLst/>
+          </a:prstGeom>
+          <a:solidFill>
+            <a:schemeClr val="accent2"/>
+          </a:solidFill>
+          <a:ln>
+            <a:noFill/>
+          </a:ln>
+        </p:spPr>
+        <p:style>
+          <a:lnRef idx="2">
+            <a:schemeClr val="accent1">
+              <a:shade val="50000"/>
+            </a:schemeClr>
+          </a:lnRef>
+          <a:fillRef idx="1">
+            <a:schemeClr val="accent1"/>
+          </a:fillRef>
+          <a:effectRef idx="0">
+            <a:schemeClr val="accent1"/>
+          </a:effectRef>
+          <a:fontRef idx="minor">
+            <a:schemeClr val="lt1"/>
+          </a:fontRef>
+        </p:style>
+        <p:txBody>
+          <a:bodyPr rtlCol="0" anchor="ctr"/>
+          <a:lstStyle/>
+          <a:p>
+            <a:pPr algn="ctr"/>
+            <a:r>
+              <a:rPr lang="en-US" dirty="0" err="1"/>
+              <a:t>FreeThenHold</a:t>
+            </a:r>
+            <a:endParaRPr lang="en-US" dirty="0"/>
+          </a:p>
+        </p:txBody>
+      </p:sp>
+      <p:cxnSp>
+        <p:nvCxnSpPr>
+          <p:cNvPr id="40" name="Straight Arrow Connector 39">
+            <a:extLst>
+              <a:ext uri="{FF2B5EF4-FFF2-40B4-BE49-F238E27FC236}">
+                <a16:creationId xmlns:a16="http://schemas.microsoft.com/office/drawing/2014/main" id="{865A4A7F-26AC-43D5-9A77-84C00618B929}"/>
+              </a:ext>
+            </a:extLst>
+          </p:cNvPr>
+          <p:cNvCxnSpPr>
+            <a:cxnSpLocks/>
+            <a:stCxn id="14" idx="2"/>
+            <a:endCxn id="37" idx="0"/>
+          </p:cNvCxnSpPr>
+          <p:nvPr/>
+        </p:nvCxnSpPr>
+        <p:spPr>
+          <a:xfrm>
+            <a:off x="4876800" y="3217817"/>
+            <a:ext cx="990600" cy="391614"/>
           </a:xfrm>
           <a:prstGeom prst="straightConnector1">
             <a:avLst/>

</xml_diff>